<commit_message>
adding R code for timeseries data
</commit_message>
<xml_diff>
--- a/Time Series_main.pptx
+++ b/Time Series_main.pptx
@@ -245,7 +245,7 @@
           <a:p>
             <a:fld id="{021F1A4F-C00B-2342-96E2-B58F2629F470}" type="datetimeFigureOut">
               <a:rPr lang="en-US" smtClean="0"/>
-              <a:t>2/16/23</a:t>
+              <a:t>4/4/2024</a:t>
             </a:fld>
             <a:endParaRPr lang="en-US"/>
           </a:p>
@@ -911,7 +911,7 @@
           <a:p>
             <a:fld id="{53211F84-CA3C-CC44-AB14-4FE988C7BD04}" type="datetimeFigureOut">
               <a:rPr lang="en-US" smtClean="0"/>
-              <a:t>2/16/23</a:t>
+              <a:t>4/4/2024</a:t>
             </a:fld>
             <a:endParaRPr lang="en-US"/>
           </a:p>
@@ -1109,7 +1109,7 @@
           <a:p>
             <a:fld id="{53211F84-CA3C-CC44-AB14-4FE988C7BD04}" type="datetimeFigureOut">
               <a:rPr lang="en-US" smtClean="0"/>
-              <a:t>2/16/23</a:t>
+              <a:t>4/4/2024</a:t>
             </a:fld>
             <a:endParaRPr lang="en-US"/>
           </a:p>
@@ -1317,7 +1317,7 @@
           <a:p>
             <a:fld id="{53211F84-CA3C-CC44-AB14-4FE988C7BD04}" type="datetimeFigureOut">
               <a:rPr lang="en-US" smtClean="0"/>
-              <a:t>2/16/23</a:t>
+              <a:t>4/4/2024</a:t>
             </a:fld>
             <a:endParaRPr lang="en-US"/>
           </a:p>
@@ -1515,7 +1515,7 @@
           <a:p>
             <a:fld id="{53211F84-CA3C-CC44-AB14-4FE988C7BD04}" type="datetimeFigureOut">
               <a:rPr lang="en-US" smtClean="0"/>
-              <a:t>2/16/23</a:t>
+              <a:t>4/4/2024</a:t>
             </a:fld>
             <a:endParaRPr lang="en-US"/>
           </a:p>
@@ -1790,7 +1790,7 @@
           <a:p>
             <a:fld id="{53211F84-CA3C-CC44-AB14-4FE988C7BD04}" type="datetimeFigureOut">
               <a:rPr lang="en-US" smtClean="0"/>
-              <a:t>2/16/23</a:t>
+              <a:t>4/4/2024</a:t>
             </a:fld>
             <a:endParaRPr lang="en-US"/>
           </a:p>
@@ -2055,7 +2055,7 @@
           <a:p>
             <a:fld id="{53211F84-CA3C-CC44-AB14-4FE988C7BD04}" type="datetimeFigureOut">
               <a:rPr lang="en-US" smtClean="0"/>
-              <a:t>2/16/23</a:t>
+              <a:t>4/4/2024</a:t>
             </a:fld>
             <a:endParaRPr lang="en-US"/>
           </a:p>
@@ -2467,7 +2467,7 @@
           <a:p>
             <a:fld id="{53211F84-CA3C-CC44-AB14-4FE988C7BD04}" type="datetimeFigureOut">
               <a:rPr lang="en-US" smtClean="0"/>
-              <a:t>2/16/23</a:t>
+              <a:t>4/4/2024</a:t>
             </a:fld>
             <a:endParaRPr lang="en-US"/>
           </a:p>
@@ -2608,7 +2608,7 @@
           <a:p>
             <a:fld id="{53211F84-CA3C-CC44-AB14-4FE988C7BD04}" type="datetimeFigureOut">
               <a:rPr lang="en-US" smtClean="0"/>
-              <a:t>2/16/23</a:t>
+              <a:t>4/4/2024</a:t>
             </a:fld>
             <a:endParaRPr lang="en-US"/>
           </a:p>
@@ -2721,7 +2721,7 @@
           <a:p>
             <a:fld id="{53211F84-CA3C-CC44-AB14-4FE988C7BD04}" type="datetimeFigureOut">
               <a:rPr lang="en-US" smtClean="0"/>
-              <a:t>2/16/23</a:t>
+              <a:t>4/4/2024</a:t>
             </a:fld>
             <a:endParaRPr lang="en-US"/>
           </a:p>
@@ -3032,7 +3032,7 @@
           <a:p>
             <a:fld id="{53211F84-CA3C-CC44-AB14-4FE988C7BD04}" type="datetimeFigureOut">
               <a:rPr lang="en-US" smtClean="0"/>
-              <a:t>2/16/23</a:t>
+              <a:t>4/4/2024</a:t>
             </a:fld>
             <a:endParaRPr lang="en-US"/>
           </a:p>
@@ -3320,7 +3320,7 @@
           <a:p>
             <a:fld id="{53211F84-CA3C-CC44-AB14-4FE988C7BD04}" type="datetimeFigureOut">
               <a:rPr lang="en-US" smtClean="0"/>
-              <a:t>2/16/23</a:t>
+              <a:t>4/4/2024</a:t>
             </a:fld>
             <a:endParaRPr lang="en-US"/>
           </a:p>
@@ -3561,7 +3561,7 @@
           <a:p>
             <a:fld id="{53211F84-CA3C-CC44-AB14-4FE988C7BD04}" type="datetimeFigureOut">
               <a:rPr lang="en-US" smtClean="0"/>
-              <a:t>2/16/23</a:t>
+              <a:t>4/4/2024</a:t>
             </a:fld>
             <a:endParaRPr lang="en-US"/>
           </a:p>
@@ -15127,9 +15127,21 @@
             </a:r>
             <a:r>
               <a:rPr lang="en-US" dirty="0"/>
-              <a:t> We use the PACF plot for AR model, but the ACF plot for MA model.</a:t>
-            </a:r>
-            <a:endParaRPr lang="en-US" b="1" u="sng" dirty="0"/>
+              <a:t> </a:t>
+            </a:r>
+            <a:r>
+              <a:rPr lang="en-US" dirty="0">
+                <a:solidFill>
+                  <a:srgbClr val="FF0000"/>
+                </a:solidFill>
+              </a:rPr>
+              <a:t>We use the PACF plot for AR model, but the ACF plot for MA model.</a:t>
+            </a:r>
+            <a:endParaRPr lang="en-US" b="1" u="sng" dirty="0">
+              <a:solidFill>
+                <a:srgbClr val="FF0000"/>
+              </a:solidFill>
+            </a:endParaRPr>
           </a:p>
         </p:txBody>
       </p:sp>

</xml_diff>